<commit_message>
updating Landscaper project with core deliverables
</commit_message>
<xml_diff>
--- a/current_week_homework_assignment_name/HW-w03/landscaper/mockup.pptx
+++ b/current_week_homework_assignment_name/HW-w03/landscaper/mockup.pptx
@@ -3386,7 +3386,7 @@
           <a:p>
             <a:fld id="{8A8A990C-8B3E-469E-B72C-C25DC0EDB798}" type="datetimeFigureOut">
               <a:rPr lang="en-US" smtClean="0"/>
-              <a:t>12/30/2019</a:t>
+              <a:t>1/6/2020</a:t>
             </a:fld>
             <a:endParaRPr lang="en-US"/>
           </a:p>
@@ -3584,7 +3584,7 @@
           <a:p>
             <a:fld id="{8A8A990C-8B3E-469E-B72C-C25DC0EDB798}" type="datetimeFigureOut">
               <a:rPr lang="en-US" smtClean="0"/>
-              <a:t>12/30/2019</a:t>
+              <a:t>1/6/2020</a:t>
             </a:fld>
             <a:endParaRPr lang="en-US"/>
           </a:p>
@@ -3792,7 +3792,7 @@
           <a:p>
             <a:fld id="{8A8A990C-8B3E-469E-B72C-C25DC0EDB798}" type="datetimeFigureOut">
               <a:rPr lang="en-US" smtClean="0"/>
-              <a:t>12/30/2019</a:t>
+              <a:t>1/6/2020</a:t>
             </a:fld>
             <a:endParaRPr lang="en-US"/>
           </a:p>
@@ -3990,7 +3990,7 @@
           <a:p>
             <a:fld id="{8A8A990C-8B3E-469E-B72C-C25DC0EDB798}" type="datetimeFigureOut">
               <a:rPr lang="en-US" smtClean="0"/>
-              <a:t>12/30/2019</a:t>
+              <a:t>1/6/2020</a:t>
             </a:fld>
             <a:endParaRPr lang="en-US"/>
           </a:p>
@@ -4265,7 +4265,7 @@
           <a:p>
             <a:fld id="{8A8A990C-8B3E-469E-B72C-C25DC0EDB798}" type="datetimeFigureOut">
               <a:rPr lang="en-US" smtClean="0"/>
-              <a:t>12/30/2019</a:t>
+              <a:t>1/6/2020</a:t>
             </a:fld>
             <a:endParaRPr lang="en-US"/>
           </a:p>
@@ -4530,7 +4530,7 @@
           <a:p>
             <a:fld id="{8A8A990C-8B3E-469E-B72C-C25DC0EDB798}" type="datetimeFigureOut">
               <a:rPr lang="en-US" smtClean="0"/>
-              <a:t>12/30/2019</a:t>
+              <a:t>1/6/2020</a:t>
             </a:fld>
             <a:endParaRPr lang="en-US"/>
           </a:p>
@@ -4942,7 +4942,7 @@
           <a:p>
             <a:fld id="{8A8A990C-8B3E-469E-B72C-C25DC0EDB798}" type="datetimeFigureOut">
               <a:rPr lang="en-US" smtClean="0"/>
-              <a:t>12/30/2019</a:t>
+              <a:t>1/6/2020</a:t>
             </a:fld>
             <a:endParaRPr lang="en-US"/>
           </a:p>
@@ -5083,7 +5083,7 @@
           <a:p>
             <a:fld id="{8A8A990C-8B3E-469E-B72C-C25DC0EDB798}" type="datetimeFigureOut">
               <a:rPr lang="en-US" smtClean="0"/>
-              <a:t>12/30/2019</a:t>
+              <a:t>1/6/2020</a:t>
             </a:fld>
             <a:endParaRPr lang="en-US"/>
           </a:p>
@@ -5196,7 +5196,7 @@
           <a:p>
             <a:fld id="{8A8A990C-8B3E-469E-B72C-C25DC0EDB798}" type="datetimeFigureOut">
               <a:rPr lang="en-US" smtClean="0"/>
-              <a:t>12/30/2019</a:t>
+              <a:t>1/6/2020</a:t>
             </a:fld>
             <a:endParaRPr lang="en-US"/>
           </a:p>
@@ -5507,7 +5507,7 @@
           <a:p>
             <a:fld id="{8A8A990C-8B3E-469E-B72C-C25DC0EDB798}" type="datetimeFigureOut">
               <a:rPr lang="en-US" smtClean="0"/>
-              <a:t>12/30/2019</a:t>
+              <a:t>1/6/2020</a:t>
             </a:fld>
             <a:endParaRPr lang="en-US"/>
           </a:p>
@@ -5795,7 +5795,7 @@
           <a:p>
             <a:fld id="{8A8A990C-8B3E-469E-B72C-C25DC0EDB798}" type="datetimeFigureOut">
               <a:rPr lang="en-US" smtClean="0"/>
-              <a:t>12/30/2019</a:t>
+              <a:t>1/6/2020</a:t>
             </a:fld>
             <a:endParaRPr lang="en-US"/>
           </a:p>
@@ -6036,7 +6036,7 @@
           <a:p>
             <a:fld id="{8A8A990C-8B3E-469E-B72C-C25DC0EDB798}" type="datetimeFigureOut">
               <a:rPr lang="en-US" smtClean="0"/>
-              <a:t>12/30/2019</a:t>
+              <a:t>1/6/2020</a:t>
             </a:fld>
             <a:endParaRPr lang="en-US"/>
           </a:p>
@@ -14164,12 +14164,48 @@
           </p:txBody>
         </p:sp>
       </p:grpSp>
+      <p:pic>
+        <p:nvPicPr>
+          <p:cNvPr id="5" name="Picture 4">
+            <a:extLst>
+              <a:ext uri="{FF2B5EF4-FFF2-40B4-BE49-F238E27FC236}">
+                <a16:creationId xmlns:a16="http://schemas.microsoft.com/office/drawing/2014/main" id="{BFA3DF32-1EF8-4A34-93EC-71676CE344A7}"/>
+              </a:ext>
+            </a:extLst>
+          </p:cNvPr>
+          <p:cNvPicPr>
+            <a:picLocks noChangeAspect="1"/>
+          </p:cNvPicPr>
+          <p:nvPr/>
+        </p:nvPicPr>
+        <p:blipFill>
+          <a:blip r:embed="rId13">
+            <a:extLst>
+              <a:ext uri="{28A0092B-C50C-407E-A947-70E740481C1C}">
+                <a14:useLocalDpi xmlns:a14="http://schemas.microsoft.com/office/drawing/2010/main" val="0"/>
+              </a:ext>
+            </a:extLst>
+          </a:blip>
+          <a:stretch>
+            <a:fillRect/>
+          </a:stretch>
+        </p:blipFill>
+        <p:spPr>
+          <a:xfrm>
+            <a:off x="9828931" y="4585016"/>
+            <a:ext cx="1524000" cy="1524000"/>
+          </a:xfrm>
+          <a:prstGeom prst="rect">
+            <a:avLst/>
+          </a:prstGeom>
+        </p:spPr>
+      </p:pic>
       <p:grpSp>
         <p:nvGrpSpPr>
-          <p:cNvPr id="8" name="Group 7">
+          <p:cNvPr id="19" name="Group 18">
             <a:extLst>
               <a:ext uri="{FF2B5EF4-FFF2-40B4-BE49-F238E27FC236}">
-                <a16:creationId xmlns:a16="http://schemas.microsoft.com/office/drawing/2014/main" id="{B058B531-F575-46DF-B5F9-39367360A045}"/>
+                <a16:creationId xmlns:a16="http://schemas.microsoft.com/office/drawing/2014/main" id="{B90B9F24-7964-4D63-BD1E-E0603168130A}"/>
               </a:ext>
             </a:extLst>
           </p:cNvPr>
@@ -14178,18 +14214,18 @@
         </p:nvGrpSpPr>
         <p:grpSpPr>
           <a:xfrm>
-            <a:off x="8728265" y="4823859"/>
-            <a:ext cx="1528872" cy="1528618"/>
-            <a:chOff x="8728265" y="4823859"/>
-            <a:chExt cx="1528872" cy="1528618"/>
+            <a:off x="7889820" y="4205222"/>
+            <a:ext cx="574729" cy="553258"/>
+            <a:chOff x="7889820" y="4205222"/>
+            <a:chExt cx="574729" cy="553258"/>
           </a:xfrm>
         </p:grpSpPr>
         <p:pic>
           <p:nvPicPr>
-            <p:cNvPr id="5" name="Picture 4">
+            <p:cNvPr id="17" name="Picture 16">
               <a:extLst>
                 <a:ext uri="{FF2B5EF4-FFF2-40B4-BE49-F238E27FC236}">
-                  <a16:creationId xmlns:a16="http://schemas.microsoft.com/office/drawing/2014/main" id="{BFA3DF32-1EF8-4A34-93EC-71676CE344A7}"/>
+                  <a16:creationId xmlns:a16="http://schemas.microsoft.com/office/drawing/2014/main" id="{B8788460-A0B6-4F0B-98DF-0DFF3DF1A669}"/>
                 </a:ext>
               </a:extLst>
             </p:cNvPr>
@@ -14199,8 +14235,17 @@
             <p:nvPr/>
           </p:nvPicPr>
           <p:blipFill>
-            <a:blip r:embed="rId13">
+            <a:blip r:embed="rId14">
               <a:extLst>
+                <a:ext uri="{BEBA8EAE-BF5A-486C-A8C5-ECC9F3942E4B}">
+                  <a14:imgProps xmlns:a14="http://schemas.microsoft.com/office/drawing/2010/main">
+                    <a14:imgLayer r:embed="rId15">
+                      <a14:imgEffect>
+                        <a14:backgroundRemoval t="0" b="100000" l="971" r="98058"/>
+                      </a14:imgEffect>
+                    </a14:imgLayer>
+                  </a14:imgProps>
+                </a:ext>
                 <a:ext uri="{28A0092B-C50C-407E-A947-70E740481C1C}">
                   <a14:useLocalDpi xmlns:a14="http://schemas.microsoft.com/office/drawing/2010/main" val="0"/>
                 </a:ext>
@@ -14212,8 +14257,8 @@
           </p:blipFill>
           <p:spPr>
             <a:xfrm>
-              <a:off x="8728265" y="4828477"/>
-              <a:ext cx="1524000" cy="1524000"/>
+              <a:off x="7911828" y="4205222"/>
+              <a:ext cx="527266" cy="522146"/>
             </a:xfrm>
             <a:prstGeom prst="rect">
               <a:avLst/>
@@ -14234,8 +14279,8 @@
           </p:nvSpPr>
           <p:spPr>
             <a:xfrm>
-              <a:off x="8730089" y="4823859"/>
-              <a:ext cx="1527048" cy="1527048"/>
+              <a:off x="7889820" y="4209840"/>
+              <a:ext cx="574729" cy="548640"/>
             </a:xfrm>
             <a:prstGeom prst="rect">
               <a:avLst/>

</xml_diff>